<commit_message>
Minor formatting and content fixes
</commit_message>
<xml_diff>
--- a/Courses/Computer-Modeling-and-IT/Computer-Modeling-and-IT-6-Class/01-Basic-Units-of-Information-Measurement/01-Basic-Units-of-Information-Measurement.pptx
+++ b/Courses/Computer-Modeling-and-IT/Computer-Modeling-and-IT-6-Class/01-Basic-Units-of-Information-Measurement/01-Basic-Units-of-Information-Measurement.pptx
@@ -279,7 +279,7 @@
           <a:p>
             <a:fld id="{4E087215-0C8F-4762-A664-737A353EC9A4}" type="datetimeFigureOut">
               <a:rPr lang="bg-BG" smtClean="0"/>
-              <a:t>4.3.2024 г.</a:t>
+              <a:t>23.03.24 г.</a:t>
             </a:fld>
             <a:endParaRPr lang="bg-BG"/>
           </a:p>
@@ -475,7 +475,7 @@
           <a:p>
             <a:fld id="{72D84649-876A-46C9-8472-14CB09C070D8}" type="datetimeFigureOut">
               <a:rPr lang="en-US" smtClean="0"/>
-              <a:t>3/4/2024</a:t>
+              <a:t>3/23/24</a:t>
             </a:fld>
             <a:endParaRPr lang="en-US"/>
           </a:p>
@@ -1232,19 +1232,19 @@
           <a:lstStyle/>
           <a:p>
             <a:r>
-              <a:rPr lang="bg-BG" sz="1100" smtClean="0"/>
+              <a:rPr lang="bg-BG" sz="1100"/>
               <a:t>Работна група </a:t>
             </a:r>
             <a:r>
-              <a:rPr lang="bg-BG" smtClean="0"/>
+              <a:rPr lang="bg-BG"/>
               <a:t>"Образование по програмиране и ИТ"</a:t>
             </a:r>
             <a:r>
-              <a:rPr lang="bg-BG" sz="1100" smtClean="0"/>
+              <a:rPr lang="bg-BG" sz="1100"/>
               <a:t>, с подкрепата на </a:t>
             </a:r>
             <a:r>
-              <a:rPr lang="en-US" sz="1100" smtClean="0">
+              <a:rPr lang="en-US" sz="1100">
                 <a:hlinkClick r:id="rId3"/>
               </a:rPr>
               <a:t>SoftUni</a:t>
@@ -6918,16 +6918,12 @@
           <a:lstStyle/>
           <a:p>
             <a:r>
-              <a:rPr lang="en-US" dirty="0" smtClean="0"/>
+              <a:rPr lang="en-US" dirty="0"/>
               <a:t>6</a:t>
             </a:r>
             <a:r>
-              <a:rPr lang="bg-BG" dirty="0" smtClean="0"/>
-              <a:t> </a:t>
-            </a:r>
-            <a:r>
               <a:rPr lang="bg-BG" dirty="0"/>
-              <a:t>клас</a:t>
+              <a:t> клас</a:t>
             </a:r>
           </a:p>
         </p:txBody>
@@ -7065,12 +7061,12 @@
         </p:spPr>
         <p:txBody>
           <a:bodyPr>
-            <a:normAutofit lnSpcReduction="10000"/>
+            <a:normAutofit/>
           </a:bodyPr>
           <a:lstStyle/>
           <a:p>
             <a:r>
-              <a:rPr lang="bg-BG" dirty="0" smtClean="0"/>
+              <a:rPr lang="bg-BG" dirty="0"/>
               <a:t>Действия с информация</a:t>
             </a:r>
             <a:endParaRPr lang="en-US" dirty="0"/>
@@ -7200,13 +7196,6 @@
       <p:transition spd="slow" advClick="0" advTm="5000"/>
     </mc:Fallback>
   </mc:AlternateContent>
-  <p:timing>
-    <p:tnLst>
-      <p:par>
-        <p:cTn id="1" dur="indefinite" restart="never" nodeType="tmRoot"/>
-      </p:par>
-    </p:tnLst>
-  </p:timing>
 </p:sld>
 </file>
 
@@ -7267,7 +7256,7 @@
           <a:lstStyle/>
           <a:p>
             <a:r>
-              <a:rPr lang="bg-BG" dirty="0" smtClean="0"/>
+              <a:rPr lang="bg-BG" dirty="0"/>
               <a:t>Информация – схема </a:t>
             </a:r>
             <a:endParaRPr lang="en-US" dirty="0"/>
@@ -7330,7 +7319,7 @@
           <a:p>
             <a:pPr algn="ctr"/>
             <a:r>
-              <a:rPr lang="bg-BG" sz="2800" b="1" dirty="0" smtClean="0">
+              <a:rPr lang="bg-BG" sz="2800" b="1" dirty="0">
                 <a:solidFill>
                   <a:srgbClr val="FFFFFF"/>
                 </a:solidFill>
@@ -7415,7 +7404,7 @@
           <a:p>
             <a:pPr algn="ctr"/>
             <a:r>
-              <a:rPr lang="bg-BG" sz="2800" b="1" dirty="0" smtClean="0">
+              <a:rPr lang="bg-BG" sz="2800" b="1" dirty="0">
                 <a:solidFill>
                   <a:srgbClr val="FFFFFF"/>
                 </a:solidFill>
@@ -7500,7 +7489,7 @@
           <a:p>
             <a:pPr algn="ctr"/>
             <a:r>
-              <a:rPr lang="bg-BG" sz="2800" b="1" dirty="0" smtClean="0">
+              <a:rPr lang="bg-BG" sz="2800" b="1" dirty="0">
                 <a:solidFill>
                   <a:srgbClr val="FFFFFF"/>
                 </a:solidFill>
@@ -7585,7 +7574,7 @@
           <a:p>
             <a:pPr algn="ctr"/>
             <a:r>
-              <a:rPr lang="bg-BG" sz="2800" b="1" dirty="0" smtClean="0">
+              <a:rPr lang="bg-BG" sz="2800" b="1" dirty="0">
                 <a:solidFill>
                   <a:srgbClr val="FFFFFF"/>
                 </a:solidFill>
@@ -8688,13 +8677,6 @@
       <p:transition spd="slow" advClick="0" advTm="5000"/>
     </mc:Fallback>
   </mc:AlternateContent>
-  <p:timing>
-    <p:tnLst>
-      <p:par>
-        <p:cTn id="1" dur="indefinite" restart="never" nodeType="tmRoot"/>
-      </p:par>
-    </p:tnLst>
-  </p:timing>
 </p:sld>
 </file>
 
@@ -8738,7 +8720,7 @@
           <a:lstStyle/>
           <a:p>
             <a:r>
-              <a:rPr lang="ru-RU" dirty="0" smtClean="0"/>
+              <a:rPr lang="ru-RU" dirty="0"/>
               <a:t>През </a:t>
             </a:r>
             <a:r>
@@ -8747,15 +8729,7 @@
             </a:r>
             <a:r>
               <a:rPr lang="ru-RU" dirty="0"/>
-              <a:t> г</a:t>
-            </a:r>
-            <a:r>
-              <a:rPr lang="ru-RU" dirty="0" smtClean="0"/>
-              <a:t>. </a:t>
-            </a:r>
-            <a:r>
-              <a:rPr lang="ru-RU" dirty="0"/>
-              <a:t>американският учен </a:t>
+              <a:t> г. американският учен </a:t>
             </a:r>
             <a:r>
               <a:rPr lang="ru-RU" b="1" dirty="0"/>
@@ -8763,7 +8737,13 @@
             </a:r>
             <a:r>
               <a:rPr lang="ru-RU" dirty="0"/>
-              <a:t>разработва концепцията за компютърната архитектура, като предложи информацията в компютрите да се представя чрез </a:t>
+              <a:t>разработва концепцията за компютърната архитектура</a:t>
+            </a:r>
+          </a:p>
+          <a:p>
+            <a:r>
+              <a:rPr lang="ru-RU" dirty="0"/>
+              <a:t>Предлага информацията в компютрите да се представя чрез </a:t>
             </a:r>
             <a:r>
               <a:rPr lang="ru-RU" b="1" dirty="0"/>
@@ -8771,10 +8751,22 @@
             </a:r>
             <a:r>
               <a:rPr lang="ru-RU" dirty="0"/>
-              <a:t>, използваща само две цифри: "0" и "1</a:t>
-            </a:r>
-            <a:r>
-              <a:rPr lang="ru-RU" dirty="0" smtClean="0"/>
+              <a:t>, използваща само две цифри: "</a:t>
+            </a:r>
+            <a:r>
+              <a:rPr lang="ru-RU" b="1" dirty="0"/>
+              <a:t>0</a:t>
+            </a:r>
+            <a:r>
+              <a:rPr lang="ru-RU" dirty="0"/>
+              <a:t>" и "</a:t>
+            </a:r>
+            <a:r>
+              <a:rPr lang="ru-RU" b="1" dirty="0"/>
+              <a:t>1</a:t>
+            </a:r>
+            <a:r>
+              <a:rPr lang="ru-RU" dirty="0"/>
               <a:t>"</a:t>
             </a:r>
             <a:endParaRPr lang="en-US" dirty="0"/>
@@ -8797,7 +8789,7 @@
           <a:lstStyle/>
           <a:p>
             <a:r>
-              <a:rPr lang="bg-BG" dirty="0" smtClean="0"/>
+              <a:rPr lang="bg-BG" dirty="0"/>
               <a:t>История на </a:t>
             </a:r>
             <a:r>
@@ -8877,7 +8869,79 @@
   <p:timing>
     <p:tnLst>
       <p:par>
-        <p:cTn id="1" dur="indefinite" restart="never" nodeType="tmRoot"/>
+        <p:cTn id="1" dur="indefinite" restart="never" nodeType="tmRoot">
+          <p:childTnLst>
+            <p:seq concurrent="1" nextAc="seek">
+              <p:cTn id="2" dur="indefinite" nodeType="mainSeq">
+                <p:childTnLst>
+                  <p:par>
+                    <p:cTn id="3" fill="hold">
+                      <p:stCondLst>
+                        <p:cond delay="indefinite"/>
+                      </p:stCondLst>
+                      <p:childTnLst>
+                        <p:par>
+                          <p:cTn id="4" fill="hold">
+                            <p:stCondLst>
+                              <p:cond delay="0"/>
+                            </p:stCondLst>
+                            <p:childTnLst>
+                              <p:par>
+                                <p:cTn id="5" presetID="1" presetClass="entr" presetSubtype="0" fill="hold" nodeType="clickEffect">
+                                  <p:stCondLst>
+                                    <p:cond delay="0"/>
+                                  </p:stCondLst>
+                                  <p:childTnLst>
+                                    <p:set>
+                                      <p:cBhvr>
+                                        <p:cTn id="6" dur="1" fill="hold">
+                                          <p:stCondLst>
+                                            <p:cond delay="0"/>
+                                          </p:stCondLst>
+                                        </p:cTn>
+                                        <p:tgtEl>
+                                          <p:spTgt spid="7">
+                                            <p:txEl>
+                                              <p:pRg st="1" end="1"/>
+                                            </p:txEl>
+                                          </p:spTgt>
+                                        </p:tgtEl>
+                                        <p:attrNameLst>
+                                          <p:attrName>style.visibility</p:attrName>
+                                        </p:attrNameLst>
+                                      </p:cBhvr>
+                                      <p:to>
+                                        <p:strVal val="visible"/>
+                                      </p:to>
+                                    </p:set>
+                                  </p:childTnLst>
+                                </p:cTn>
+                              </p:par>
+                            </p:childTnLst>
+                          </p:cTn>
+                        </p:par>
+                      </p:childTnLst>
+                    </p:cTn>
+                  </p:par>
+                </p:childTnLst>
+              </p:cTn>
+              <p:prevCondLst>
+                <p:cond evt="onPrev" delay="0">
+                  <p:tgtEl>
+                    <p:sldTgt/>
+                  </p:tgtEl>
+                </p:cond>
+              </p:prevCondLst>
+              <p:nextCondLst>
+                <p:cond evt="onNext" delay="0">
+                  <p:tgtEl>
+                    <p:sldTgt/>
+                  </p:tgtEl>
+                </p:cond>
+              </p:nextCondLst>
+            </p:seq>
+          </p:childTnLst>
+        </p:cTn>
       </p:par>
     </p:tnLst>
   </p:timing>
@@ -8946,15 +9010,11 @@
           <a:lstStyle/>
           <a:p>
             <a:r>
-              <a:rPr lang="ru-RU" dirty="0" smtClean="0"/>
-              <a:t>Най-малката </a:t>
-            </a:r>
-            <a:r>
               <a:rPr lang="ru-RU" dirty="0"/>
-              <a:t>единица за измерване е </a:t>
-            </a:r>
-            <a:r>
-              <a:rPr lang="ru-RU" b="1" dirty="0" smtClean="0">
+              <a:t>Най-малката единица за измерване е </a:t>
+            </a:r>
+            <a:r>
+              <a:rPr lang="ru-RU" b="1" dirty="0">
                 <a:solidFill>
                   <a:schemeClr val="bg1"/>
                 </a:solidFill>
@@ -8962,20 +9022,16 @@
               <a:t>бит</a:t>
             </a:r>
             <a:r>
-              <a:rPr lang="ru-RU" dirty="0" smtClean="0"/>
+              <a:rPr lang="ru-RU" dirty="0"/>
               <a:t> (</a:t>
             </a:r>
             <a:r>
-              <a:rPr lang="en-US" b="1" dirty="0" smtClean="0"/>
+              <a:rPr lang="en-US" b="1" dirty="0"/>
               <a:t>bit</a:t>
             </a:r>
             <a:r>
-              <a:rPr lang="ru-RU" dirty="0" smtClean="0"/>
-              <a:t>), </a:t>
-            </a:r>
-            <a:r>
               <a:rPr lang="ru-RU" dirty="0"/>
-              <a:t>произлизащ от "</a:t>
+              <a:t>), произлизащ от "</a:t>
             </a:r>
             <a:r>
               <a:rPr lang="ru-RU" b="1" dirty="0">
@@ -8987,14 +9043,10 @@
             </a:r>
             <a:r>
               <a:rPr lang="ru-RU" b="1" dirty="0"/>
-              <a:t>nary </a:t>
-            </a:r>
-            <a:r>
-              <a:rPr lang="ru-RU" b="1" dirty="0" smtClean="0"/>
-              <a:t>digi</a:t>
-            </a:r>
-            <a:r>
-              <a:rPr lang="ru-RU" b="1" dirty="0" smtClean="0">
+              <a:t>nary digi</a:t>
+            </a:r>
+            <a:r>
+              <a:rPr lang="ru-RU" b="1" dirty="0">
                 <a:solidFill>
                   <a:schemeClr val="bg1"/>
                 </a:solidFill>
@@ -9002,27 +9054,23 @@
               <a:t>t</a:t>
             </a:r>
             <a:r>
-              <a:rPr lang="ru-RU" dirty="0" smtClean="0"/>
+              <a:rPr lang="ru-RU" dirty="0"/>
               <a:t>"</a:t>
             </a:r>
             <a:r>
-              <a:rPr lang="en-US" dirty="0" smtClean="0"/>
+              <a:rPr lang="en-US" dirty="0"/>
               <a:t> </a:t>
             </a:r>
             <a:r>
-              <a:rPr lang="bg-BG" dirty="0" smtClean="0"/>
+              <a:rPr lang="bg-BG" dirty="0"/>
               <a:t>(двоична цифра)</a:t>
             </a:r>
           </a:p>
           <a:p>
             <a:pPr lvl="1"/>
             <a:r>
-              <a:rPr lang="bg-BG" dirty="0" smtClean="0"/>
-              <a:t>Битът може да приема стойностите </a:t>
-            </a:r>
-            <a:r>
               <a:rPr lang="bg-BG" dirty="0"/>
-              <a:t>"</a:t>
+              <a:t>Битът може да приема стойностите "</a:t>
             </a:r>
             <a:r>
               <a:rPr lang="bg-BG" b="1" dirty="0"/>
@@ -9033,54 +9081,50 @@
               <a:t>" или "</a:t>
             </a:r>
             <a:r>
-              <a:rPr lang="bg-BG" b="1" dirty="0" smtClean="0"/>
+              <a:rPr lang="bg-BG" b="1" dirty="0"/>
               <a:t>1</a:t>
             </a:r>
             <a:r>
-              <a:rPr lang="bg-BG" dirty="0" smtClean="0"/>
+              <a:rPr lang="bg-BG" dirty="0"/>
               <a:t>" (</a:t>
             </a:r>
             <a:r>
-              <a:rPr lang="en-US" b="1" dirty="0" smtClean="0"/>
+              <a:rPr lang="en-US" b="1" dirty="0"/>
               <a:t>false</a:t>
             </a:r>
             <a:r>
-              <a:rPr lang="en-US" dirty="0" smtClean="0"/>
+              <a:rPr lang="en-US" dirty="0"/>
               <a:t> </a:t>
             </a:r>
             <a:r>
-              <a:rPr lang="bg-BG" dirty="0" smtClean="0"/>
+              <a:rPr lang="bg-BG" dirty="0"/>
               <a:t>или </a:t>
             </a:r>
             <a:r>
-              <a:rPr lang="en-US" b="1" dirty="0" smtClean="0"/>
+              <a:rPr lang="en-US" b="1" dirty="0"/>
               <a:t>true</a:t>
             </a:r>
             <a:r>
-              <a:rPr lang="bg-BG" dirty="0" smtClean="0"/>
+              <a:rPr lang="bg-BG" dirty="0"/>
               <a:t>)</a:t>
             </a:r>
-            <a:endParaRPr lang="ru-RU" dirty="0" smtClean="0"/>
-          </a:p>
-          <a:p>
-            <a:r>
-              <a:rPr lang="ru-RU" dirty="0" smtClean="0"/>
-              <a:t>За </a:t>
-            </a:r>
+            <a:endParaRPr lang="ru-RU" dirty="0"/>
+          </a:p>
+          <a:p>
             <a:r>
               <a:rPr lang="ru-RU" dirty="0"/>
-              <a:t>по-голям обем информация се използват поредици от битове, където </a:t>
+              <a:t>За по-голям обем информация се използват поредици от битове, където </a:t>
             </a:r>
             <a:r>
               <a:rPr lang="ru-RU" b="1" dirty="0"/>
               <a:t>осем бита </a:t>
             </a:r>
             <a:r>
-              <a:rPr lang="ru-RU" dirty="0" smtClean="0"/>
+              <a:rPr lang="ru-RU" dirty="0"/>
               <a:t>формират </a:t>
             </a:r>
             <a:r>
-              <a:rPr lang="ru-RU" b="1" dirty="0" smtClean="0">
+              <a:rPr lang="ru-RU" b="1" dirty="0">
                 <a:solidFill>
                   <a:schemeClr val="bg1"/>
                 </a:solidFill>
@@ -9088,15 +9132,15 @@
               <a:t>байт</a:t>
             </a:r>
             <a:r>
-              <a:rPr lang="ru-RU" dirty="0" smtClean="0"/>
+              <a:rPr lang="ru-RU" dirty="0"/>
               <a:t> (</a:t>
             </a:r>
             <a:r>
-              <a:rPr lang="en-US" b="1" dirty="0" smtClean="0"/>
+              <a:rPr lang="en-US" b="1" dirty="0"/>
               <a:t>byte</a:t>
             </a:r>
             <a:r>
-              <a:rPr lang="ru-RU" dirty="0" smtClean="0"/>
+              <a:rPr lang="ru-RU" dirty="0"/>
               <a:t>)</a:t>
             </a:r>
             <a:endParaRPr lang="en-US" dirty="0"/>
@@ -9119,14 +9163,13 @@
           <a:lstStyle/>
           <a:p>
             <a:r>
-              <a:rPr lang="bg-BG" dirty="0" smtClean="0"/>
+              <a:rPr lang="bg-BG" dirty="0"/>
               <a:t>Основни единици</a:t>
             </a:r>
             <a:r>
-              <a:rPr lang="en-US" dirty="0" smtClean="0"/>
+              <a:rPr lang="en-US" dirty="0"/>
               <a:t> (1)</a:t>
             </a:r>
-            <a:endParaRPr lang="en-US" dirty="0"/>
           </a:p>
         </p:txBody>
       </p:sp>
@@ -9241,10 +9284,9 @@
               <a:buSzPct val="70000"/>
             </a:pPr>
             <a:r>
-              <a:rPr lang="en-US" sz="3200" dirty="0" smtClean="0"/>
+              <a:rPr lang="en-US" sz="3200" dirty="0"/>
               <a:t>8 Bits</a:t>
             </a:r>
-            <a:endParaRPr lang="en-US" sz="3200" dirty="0"/>
           </a:p>
         </p:txBody>
       </p:sp>
@@ -9304,7 +9346,7 @@
           <a:p>
             <a:pPr algn="ctr"/>
             <a:r>
-              <a:rPr lang="en-US" sz="2800" b="1" dirty="0" smtClean="0">
+              <a:rPr lang="en-US" sz="2800" b="1" dirty="0">
                 <a:solidFill>
                   <a:srgbClr val="FFFFFF"/>
                 </a:solidFill>
@@ -9318,18 +9360,6 @@
               </a:rPr>
               <a:t>1</a:t>
             </a:r>
-            <a:endParaRPr lang="en-US" sz="2800" b="1" dirty="0">
-              <a:solidFill>
-                <a:srgbClr val="FFFFFF"/>
-              </a:solidFill>
-              <a:effectLst>
-                <a:outerShdw blurRad="38100" dist="38100" dir="2700000" algn="tl">
-                  <a:srgbClr val="000000">
-                    <a:alpha val="43137"/>
-                  </a:srgbClr>
-                </a:outerShdw>
-              </a:effectLst>
-            </a:endParaRPr>
           </a:p>
         </p:txBody>
       </p:sp>
@@ -9389,7 +9419,7 @@
           <a:p>
             <a:pPr algn="ctr"/>
             <a:r>
-              <a:rPr lang="en-US" sz="2800" b="1" dirty="0" smtClean="0">
+              <a:rPr lang="en-US" sz="2800" b="1" dirty="0">
                 <a:solidFill>
                   <a:srgbClr val="FFFFFF"/>
                 </a:solidFill>
@@ -9403,18 +9433,6 @@
               </a:rPr>
               <a:t>0</a:t>
             </a:r>
-            <a:endParaRPr lang="en-US" sz="2800" b="1" dirty="0">
-              <a:solidFill>
-                <a:srgbClr val="FFFFFF"/>
-              </a:solidFill>
-              <a:effectLst>
-                <a:outerShdw blurRad="38100" dist="38100" dir="2700000" algn="tl">
-                  <a:srgbClr val="000000">
-                    <a:alpha val="43137"/>
-                  </a:srgbClr>
-                </a:outerShdw>
-              </a:effectLst>
-            </a:endParaRPr>
           </a:p>
         </p:txBody>
       </p:sp>
@@ -9766,7 +9784,7 @@
           <a:p>
             <a:pPr algn="ctr"/>
             <a:r>
-              <a:rPr lang="en-US" sz="2800" b="1" dirty="0" smtClean="0">
+              <a:rPr lang="en-US" sz="2800" b="1" dirty="0">
                 <a:solidFill>
                   <a:srgbClr val="FFFFFF"/>
                 </a:solidFill>
@@ -9780,18 +9798,6 @@
               </a:rPr>
               <a:t>1</a:t>
             </a:r>
-            <a:endParaRPr lang="en-US" sz="2800" b="1" dirty="0">
-              <a:solidFill>
-                <a:srgbClr val="FFFFFF"/>
-              </a:solidFill>
-              <a:effectLst>
-                <a:outerShdw blurRad="38100" dist="38100" dir="2700000" algn="tl">
-                  <a:srgbClr val="000000">
-                    <a:alpha val="43137"/>
-                  </a:srgbClr>
-                </a:outerShdw>
-              </a:effectLst>
-            </a:endParaRPr>
           </a:p>
         </p:txBody>
       </p:sp>
@@ -10078,7 +10084,7 @@
             <a:p>
               <a:pPr algn="ctr"/>
               <a:r>
-                <a:rPr lang="en-US" sz="2800" b="1" dirty="0" smtClean="0">
+                <a:rPr lang="en-US" sz="2800" b="1" dirty="0">
                   <a:solidFill>
                     <a:srgbClr val="FFFFFF"/>
                   </a:solidFill>
@@ -10092,18 +10098,6 @@
                 </a:rPr>
                 <a:t>1</a:t>
               </a:r>
-              <a:endParaRPr lang="en-US" sz="2800" b="1" dirty="0">
-                <a:solidFill>
-                  <a:srgbClr val="FFFFFF"/>
-                </a:solidFill>
-                <a:effectLst>
-                  <a:outerShdw blurRad="38100" dist="38100" dir="2700000" algn="tl">
-                    <a:srgbClr val="000000">
-                      <a:alpha val="43137"/>
-                    </a:srgbClr>
-                  </a:outerShdw>
-                </a:effectLst>
-              </a:endParaRPr>
             </a:p>
           </p:txBody>
         </p:sp>
@@ -10163,7 +10157,7 @@
             <a:p>
               <a:pPr algn="ctr"/>
               <a:r>
-                <a:rPr lang="en-US" sz="2800" b="1" dirty="0" smtClean="0">
+                <a:rPr lang="en-US" sz="2800" b="1" dirty="0">
                   <a:solidFill>
                     <a:srgbClr val="FFFFFF"/>
                   </a:solidFill>
@@ -10177,18 +10171,6 @@
                 </a:rPr>
                 <a:t>0</a:t>
               </a:r>
-              <a:endParaRPr lang="en-US" sz="2800" b="1" dirty="0">
-                <a:solidFill>
-                  <a:srgbClr val="FFFFFF"/>
-                </a:solidFill>
-                <a:effectLst>
-                  <a:outerShdw blurRad="38100" dist="38100" dir="2700000" algn="tl">
-                    <a:srgbClr val="000000">
-                      <a:alpha val="43137"/>
-                    </a:srgbClr>
-                  </a:outerShdw>
-                </a:effectLst>
-              </a:endParaRPr>
             </a:p>
           </p:txBody>
         </p:sp>
@@ -10540,7 +10522,7 @@
             <a:p>
               <a:pPr algn="ctr"/>
               <a:r>
-                <a:rPr lang="en-US" sz="2800" b="1" dirty="0" smtClean="0">
+                <a:rPr lang="en-US" sz="2800" b="1" dirty="0">
                   <a:solidFill>
                     <a:srgbClr val="FFFFFF"/>
                   </a:solidFill>
@@ -10554,18 +10536,6 @@
                 </a:rPr>
                 <a:t>1</a:t>
               </a:r>
-              <a:endParaRPr lang="en-US" sz="2800" b="1" dirty="0">
-                <a:solidFill>
-                  <a:srgbClr val="FFFFFF"/>
-                </a:solidFill>
-                <a:effectLst>
-                  <a:outerShdw blurRad="38100" dist="38100" dir="2700000" algn="tl">
-                    <a:srgbClr val="000000">
-                      <a:alpha val="43137"/>
-                    </a:srgbClr>
-                  </a:outerShdw>
-                </a:effectLst>
-              </a:endParaRPr>
             </a:p>
           </p:txBody>
         </p:sp>
@@ -10608,10 +10578,9 @@
               <a:buSzPct val="70000"/>
             </a:pPr>
             <a:r>
-              <a:rPr lang="en-US" sz="3200" dirty="0" smtClean="0"/>
+              <a:rPr lang="en-US" sz="3200" dirty="0"/>
               <a:t>1 Byte</a:t>
             </a:r>
-            <a:endParaRPr lang="en-US" sz="3200" dirty="0"/>
           </a:p>
         </p:txBody>
       </p:sp>
@@ -11212,57 +11181,57 @@
           <a:lstStyle/>
           <a:p>
             <a:r>
-              <a:rPr lang="bg-BG" b="1" dirty="0" smtClean="0"/>
+              <a:rPr lang="bg-BG" b="1" dirty="0"/>
               <a:t>Бит</a:t>
             </a:r>
             <a:r>
-              <a:rPr lang="bg-BG" dirty="0" smtClean="0"/>
+              <a:rPr lang="bg-BG" dirty="0"/>
               <a:t> (</a:t>
             </a:r>
             <a:r>
-              <a:rPr lang="en-US" dirty="0" smtClean="0"/>
+              <a:rPr lang="en-US" dirty="0"/>
               <a:t>b</a:t>
             </a:r>
             <a:r>
-              <a:rPr lang="bg-BG" dirty="0" smtClean="0"/>
+              <a:rPr lang="bg-BG" dirty="0"/>
               <a:t>)</a:t>
             </a:r>
-            <a:endParaRPr lang="en-US" dirty="0" smtClean="0"/>
-          </a:p>
-          <a:p>
-            <a:r>
-              <a:rPr lang="bg-BG" b="1" dirty="0" smtClean="0"/>
+            <a:endParaRPr lang="en-US" dirty="0"/>
+          </a:p>
+          <a:p>
+            <a:r>
+              <a:rPr lang="bg-BG" b="1" dirty="0"/>
               <a:t>Байт</a:t>
             </a:r>
             <a:r>
-              <a:rPr lang="bg-BG" dirty="0" smtClean="0"/>
+              <a:rPr lang="bg-BG" dirty="0"/>
               <a:t> (</a:t>
             </a:r>
             <a:r>
-              <a:rPr lang="en-US" dirty="0" smtClean="0"/>
+              <a:rPr lang="en-US" dirty="0"/>
               <a:t>B</a:t>
             </a:r>
             <a:r>
-              <a:rPr lang="bg-BG" dirty="0" smtClean="0"/>
+              <a:rPr lang="bg-BG" dirty="0"/>
               <a:t>)</a:t>
             </a:r>
             <a:r>
-              <a:rPr lang="en-US" dirty="0" smtClean="0"/>
+              <a:rPr lang="en-US" dirty="0"/>
               <a:t>: 1B = 8</a:t>
             </a:r>
             <a:r>
-              <a:rPr lang="bg-BG" dirty="0" smtClean="0"/>
+              <a:rPr lang="bg-BG" dirty="0"/>
               <a:t> бита</a:t>
             </a:r>
-            <a:endParaRPr lang="en-US" dirty="0" smtClean="0"/>
-          </a:p>
-          <a:p>
-            <a:r>
-              <a:rPr lang="bg-BG" b="1" dirty="0" smtClean="0"/>
+            <a:endParaRPr lang="en-US" dirty="0"/>
+          </a:p>
+          <a:p>
+            <a:r>
+              <a:rPr lang="bg-BG" b="1" dirty="0"/>
               <a:t>͏</a:t>
             </a:r>
             <a:r>
-              <a:rPr lang="bg-BG" b="1" dirty="0" smtClean="0">
+              <a:rPr lang="bg-BG" b="1" dirty="0">
                 <a:solidFill>
                   <a:schemeClr val="bg1"/>
                 </a:solidFill>
@@ -11270,42 +11239,42 @@
               <a:t>͏Кило</a:t>
             </a:r>
             <a:r>
-              <a:rPr lang="bg-BG" b="1" dirty="0" smtClean="0"/>
+              <a:rPr lang="bg-BG" b="1" dirty="0"/>
               <a:t>байт</a:t>
             </a:r>
             <a:r>
-              <a:rPr lang="bg-BG" dirty="0" smtClean="0"/>
+              <a:rPr lang="bg-BG" dirty="0"/>
               <a:t> </a:t>
             </a:r>
             <a:r>
-              <a:rPr lang="en-US" dirty="0" smtClean="0"/>
+              <a:rPr lang="en-US" dirty="0"/>
               <a:t>(KB): 1KB = 10</a:t>
             </a:r>
             <a:r>
-              <a:rPr lang="en-US" baseline="30000" dirty="0" smtClean="0"/>
+              <a:rPr lang="en-US" baseline="30000" dirty="0"/>
               <a:t>3</a:t>
             </a:r>
             <a:r>
-              <a:rPr lang="en-US" dirty="0" smtClean="0"/>
+              <a:rPr lang="en-US" dirty="0"/>
               <a:t> </a:t>
             </a:r>
             <a:r>
-              <a:rPr lang="bg-BG" dirty="0" smtClean="0"/>
+              <a:rPr lang="bg-BG" dirty="0"/>
               <a:t>байта = 1000 </a:t>
             </a:r>
             <a:r>
-              <a:rPr lang="en-US" dirty="0" smtClean="0"/>
+              <a:rPr lang="en-US" dirty="0"/>
               <a:t>B</a:t>
             </a:r>
             <a:endParaRPr lang="bg-BG" baseline="30000" dirty="0"/>
           </a:p>
           <a:p>
             <a:r>
-              <a:rPr lang="bg-BG" b="1" dirty="0" smtClean="0"/>
+              <a:rPr lang="bg-BG" b="1" dirty="0"/>
               <a:t>͏</a:t>
             </a:r>
             <a:r>
-              <a:rPr lang="bg-BG" b="1" dirty="0" smtClean="0">
+              <a:rPr lang="bg-BG" b="1" dirty="0">
                 <a:solidFill>
                   <a:schemeClr val="bg1"/>
                 </a:solidFill>
@@ -11313,38 +11282,38 @@
               <a:t>Мега</a:t>
             </a:r>
             <a:r>
-              <a:rPr lang="bg-BG" b="1" dirty="0" smtClean="0"/>
+              <a:rPr lang="bg-BG" b="1" dirty="0"/>
               <a:t>байт</a:t>
             </a:r>
             <a:r>
-              <a:rPr lang="en-US" dirty="0" smtClean="0"/>
+              <a:rPr lang="en-US" dirty="0"/>
               <a:t> (MB): 1MB = 10</a:t>
             </a:r>
             <a:r>
-              <a:rPr lang="en-US" baseline="30000" dirty="0" smtClean="0"/>
+              <a:rPr lang="en-US" baseline="30000" dirty="0"/>
               <a:t>6</a:t>
             </a:r>
             <a:r>
-              <a:rPr lang="en-US" dirty="0" smtClean="0"/>
+              <a:rPr lang="en-US" dirty="0"/>
               <a:t> </a:t>
             </a:r>
             <a:r>
-              <a:rPr lang="bg-BG" dirty="0" smtClean="0"/>
+              <a:rPr lang="bg-BG" dirty="0"/>
               <a:t>байта  = 1000 </a:t>
             </a:r>
             <a:r>
-              <a:rPr lang="en-US" dirty="0" smtClean="0"/>
+              <a:rPr lang="en-US" dirty="0"/>
               <a:t>KB</a:t>
             </a:r>
-            <a:endParaRPr lang="bg-BG" dirty="0" smtClean="0"/>
-          </a:p>
-          <a:p>
-            <a:r>
-              <a:rPr lang="bg-BG" b="1" dirty="0" smtClean="0"/>
+            <a:endParaRPr lang="bg-BG" dirty="0"/>
+          </a:p>
+          <a:p>
+            <a:r>
+              <a:rPr lang="bg-BG" b="1" dirty="0"/>
               <a:t>͏</a:t>
             </a:r>
             <a:r>
-              <a:rPr lang="bg-BG" b="1" dirty="0" smtClean="0">
+              <a:rPr lang="bg-BG" b="1" dirty="0">
                 <a:solidFill>
                   <a:schemeClr val="bg1"/>
                 </a:solidFill>
@@ -11352,35 +11321,19 @@
               <a:t>Гига</a:t>
             </a:r>
             <a:r>
-              <a:rPr lang="bg-BG" b="1" dirty="0" smtClean="0"/>
+              <a:rPr lang="bg-BG" b="1" dirty="0"/>
               <a:t>байт</a:t>
             </a:r>
             <a:r>
-              <a:rPr lang="en-US" dirty="0" smtClean="0"/>
-              <a:t> (GB)</a:t>
-            </a:r>
-            <a:r>
               <a:rPr lang="en-US" dirty="0"/>
-              <a:t> : </a:t>
-            </a:r>
-            <a:r>
-              <a:rPr lang="en-US" dirty="0" smtClean="0"/>
-              <a:t>1GB </a:t>
+              <a:t> (GB) : 1GB = 10</a:t>
+            </a:r>
+            <a:r>
+              <a:rPr lang="en-US" baseline="30000" dirty="0"/>
+              <a:t>9</a:t>
             </a:r>
             <a:r>
               <a:rPr lang="en-US" dirty="0"/>
-              <a:t>= </a:t>
-            </a:r>
-            <a:r>
-              <a:rPr lang="en-US" dirty="0" smtClean="0"/>
-              <a:t>10</a:t>
-            </a:r>
-            <a:r>
-              <a:rPr lang="en-US" baseline="30000" dirty="0" smtClean="0"/>
-              <a:t>9</a:t>
-            </a:r>
-            <a:r>
-              <a:rPr lang="en-US" dirty="0" smtClean="0"/>
               <a:t> </a:t>
             </a:r>
             <a:r>
@@ -11389,21 +11342,17 @@
             </a:r>
             <a:r>
               <a:rPr lang="en-US" dirty="0"/>
-              <a:t>M</a:t>
-            </a:r>
-            <a:r>
-              <a:rPr lang="en-US" dirty="0" smtClean="0"/>
-              <a:t>B</a:t>
-            </a:r>
-            <a:endParaRPr lang="bg-BG" dirty="0" smtClean="0"/>
-          </a:p>
-          <a:p>
-            <a:r>
-              <a:rPr lang="bg-BG" b="1" dirty="0" smtClean="0"/>
+              <a:t>MB</a:t>
+            </a:r>
+            <a:endParaRPr lang="bg-BG" dirty="0"/>
+          </a:p>
+          <a:p>
+            <a:r>
+              <a:rPr lang="bg-BG" b="1" dirty="0"/>
               <a:t>͏</a:t>
             </a:r>
             <a:r>
-              <a:rPr lang="bg-BG" b="1" dirty="0" smtClean="0">
+              <a:rPr lang="bg-BG" b="1" dirty="0">
                 <a:solidFill>
                   <a:schemeClr val="bg1"/>
                 </a:solidFill>
@@ -11411,35 +11360,19 @@
               <a:t>͏Тера</a:t>
             </a:r>
             <a:r>
-              <a:rPr lang="bg-BG" b="1" dirty="0" smtClean="0"/>
+              <a:rPr lang="bg-BG" b="1" dirty="0"/>
               <a:t>байт</a:t>
             </a:r>
             <a:r>
-              <a:rPr lang="en-US" dirty="0" smtClean="0"/>
-              <a:t> (TB)</a:t>
-            </a:r>
-            <a:r>
               <a:rPr lang="en-US" dirty="0"/>
-              <a:t> : </a:t>
-            </a:r>
-            <a:r>
-              <a:rPr lang="en-US" dirty="0" smtClean="0"/>
-              <a:t>1TB </a:t>
+              <a:t> (TB) : 1TB = 10</a:t>
+            </a:r>
+            <a:r>
+              <a:rPr lang="en-US" baseline="30000" dirty="0"/>
+              <a:t>12</a:t>
             </a:r>
             <a:r>
               <a:rPr lang="en-US" dirty="0"/>
-              <a:t>= </a:t>
-            </a:r>
-            <a:r>
-              <a:rPr lang="en-US" dirty="0" smtClean="0"/>
-              <a:t>10</a:t>
-            </a:r>
-            <a:r>
-              <a:rPr lang="en-US" baseline="30000" dirty="0" smtClean="0"/>
-              <a:t>12</a:t>
-            </a:r>
-            <a:r>
-              <a:rPr lang="en-US" dirty="0" smtClean="0"/>
               <a:t> </a:t>
             </a:r>
             <a:r>
@@ -11447,7 +11380,7 @@
               <a:t>байта  = 1000 </a:t>
             </a:r>
             <a:r>
-              <a:rPr lang="en-US" dirty="0" smtClean="0"/>
+              <a:rPr lang="en-US" dirty="0"/>
               <a:t>GB</a:t>
             </a:r>
             <a:endParaRPr lang="bg-BG" dirty="0"/>
@@ -11475,21 +11408,8 @@
             </a:r>
             <a:r>
               <a:rPr lang="en-US" dirty="0"/>
-              <a:t> </a:t>
-            </a:r>
-            <a:r>
-              <a:rPr lang="en-US" dirty="0" smtClean="0"/>
-              <a:t>(</a:t>
-            </a:r>
-            <a:r>
-              <a:rPr lang="en-US" dirty="0"/>
-              <a:t>2</a:t>
-            </a:r>
-            <a:r>
-              <a:rPr lang="en-US" dirty="0" smtClean="0"/>
-              <a:t>)</a:t>
-            </a:r>
-            <a:endParaRPr lang="en-US" dirty="0"/>
+              <a:t> (2)</a:t>
+            </a:r>
           </a:p>
         </p:txBody>
       </p:sp>
@@ -12457,7 +12377,7 @@
               </a:buClr>
             </a:pPr>
             <a:r>
-              <a:rPr lang="bg-BG" sz="3200" b="1" dirty="0" smtClean="0">
+              <a:rPr lang="bg-BG" sz="3200" b="1" dirty="0">
                 <a:solidFill>
                   <a:schemeClr val="bg1">
                     <a:lumMod val="60000"/>
@@ -12468,7 +12388,7 @@
               <a:t>Информация</a:t>
             </a:r>
             <a:r>
-              <a:rPr lang="bg-BG" sz="2800" dirty="0" smtClean="0">
+              <a:rPr lang="bg-BG" sz="2800" dirty="0">
                 <a:solidFill>
                   <a:schemeClr val="bg2"/>
                 </a:solidFill>
@@ -12512,7 +12432,7 @@
           <a:p>
             <a:pPr lvl="1"/>
             <a:r>
-              <a:rPr lang="bg-BG" sz="2800" dirty="0" smtClean="0">
+              <a:rPr lang="bg-BG" sz="2800" dirty="0">
                 <a:solidFill>
                   <a:schemeClr val="bg2"/>
                 </a:solidFill>
@@ -12559,21 +12479,13 @@
                   <a:schemeClr val="bg2"/>
                 </a:solidFill>
               </a:rPr>
-              <a:t>на </a:t>
-            </a:r>
-            <a:r>
-              <a:rPr lang="ru-RU" sz="3200" dirty="0" smtClean="0">
-                <a:solidFill>
-                  <a:schemeClr val="bg2"/>
-                </a:solidFill>
-              </a:rPr>
-              <a:t>информация</a:t>
+              <a:t>на информация</a:t>
             </a:r>
           </a:p>
           <a:p>
             <a:pPr lvl="1"/>
             <a:r>
-              <a:rPr lang="bg-BG" sz="2800" dirty="0" smtClean="0">
+              <a:rPr lang="bg-BG" sz="2800" dirty="0">
                 <a:solidFill>
                   <a:schemeClr val="bg2"/>
                 </a:solidFill>
@@ -12584,18 +12496,13 @@
           <a:p>
             <a:pPr lvl="1"/>
             <a:r>
-              <a:rPr lang="bg-BG" sz="2800" dirty="0" smtClean="0">
+              <a:rPr lang="bg-BG" sz="2800" dirty="0">
                 <a:solidFill>
                   <a:schemeClr val="bg2"/>
                 </a:solidFill>
               </a:rPr>
               <a:t>Байт</a:t>
             </a:r>
-            <a:endParaRPr lang="bg-BG" sz="2800" dirty="0">
-              <a:solidFill>
-                <a:schemeClr val="bg2"/>
-              </a:solidFill>
-            </a:endParaRPr>
           </a:p>
           <a:p>
             <a:pPr marL="888666" lvl="1" indent="-355600">
@@ -12742,18 +12649,13 @@
               <a:buChar char="§"/>
             </a:pPr>
             <a:r>
-              <a:rPr lang="bg-BG" sz="2800" dirty="0" smtClean="0">
+              <a:rPr lang="bg-BG" sz="2800" dirty="0">
                 <a:solidFill>
                   <a:schemeClr val="bg2"/>
                 </a:solidFill>
               </a:rPr>
               <a:t>Гигабайт</a:t>
             </a:r>
-            <a:endParaRPr lang="bg-BG" sz="2800" dirty="0">
-              <a:solidFill>
-                <a:schemeClr val="bg2"/>
-              </a:solidFill>
-            </a:endParaRPr>
           </a:p>
           <a:p>
             <a:pPr marL="532781" indent="-380762" defTabSz="1218438">
@@ -12774,7 +12676,7 @@
               <a:buChar char="§"/>
             </a:pPr>
             <a:r>
-              <a:rPr lang="bg-BG" sz="2800" dirty="0" smtClean="0">
+              <a:rPr lang="bg-BG" sz="2800" dirty="0">
                 <a:solidFill>
                   <a:schemeClr val="bg2"/>
                 </a:solidFill>
@@ -13493,7 +13395,7 @@
                 <a:hlinkClick r:id="rId3">
                   <a:extLst>
                     <a:ext uri="{A12FA001-AC4F-418D-AE19-62706E023703}">
-                      <ahyp:hlinkClr xmlns="" xmlns:ahyp="http://schemas.microsoft.com/office/drawing/2018/hyperlinkcolor" val="tx"/>
+                      <ahyp:hlinkClr xmlns:ahyp="http://schemas.microsoft.com/office/drawing/2018/hyperlinkcolor" val="tx"/>
                     </a:ext>
                   </a:extLst>
                 </a:hlinkClick>
@@ -13566,13 +13468,6 @@
       <p:transition spd="slow" advClick="0" advTm="5000"/>
     </mc:Fallback>
   </mc:AlternateContent>
-  <p:timing>
-    <p:tnLst>
-      <p:par>
-        <p:cTn id="1" dur="indefinite" restart="never" nodeType="tmRoot"/>
-      </p:par>
-    </p:tnLst>
-  </p:timing>
 </p:sld>
 </file>
 
@@ -13956,13 +13851,6 @@
       <p:transition spd="slow" advClick="0" advTm="5000"/>
     </mc:Fallback>
   </mc:AlternateContent>
-  <p:timing>
-    <p:tnLst>
-      <p:par>
-        <p:cTn id="1" dur="indefinite" restart="never" nodeType="tmRoot"/>
-      </p:par>
-    </p:tnLst>
-  </p:timing>
 </p:sld>
 </file>
 
@@ -14134,65 +14022,65 @@
           <a:lstStyle/>
           <a:p>
             <a:r>
-              <a:rPr lang="bg-BG" dirty="0" smtClean="0"/>
+              <a:rPr lang="bg-BG" dirty="0"/>
               <a:t>͏</a:t>
             </a:r>
             <a:r>
-              <a:rPr lang="bg-BG" b="1" dirty="0" smtClean="0"/>
+              <a:rPr lang="bg-BG" b="1" dirty="0"/>
               <a:t>Информация</a:t>
             </a:r>
             <a:r>
-              <a:rPr lang="bg-BG" dirty="0" smtClean="0"/>
+              <a:rPr lang="bg-BG" dirty="0"/>
               <a:t>:</a:t>
             </a:r>
           </a:p>
           <a:p>
             <a:pPr lvl="1"/>
             <a:r>
-              <a:rPr lang="bg-BG" dirty="0" smtClean="0"/>
+              <a:rPr lang="bg-BG" dirty="0"/>
               <a:t>Събиране</a:t>
             </a:r>
           </a:p>
           <a:p>
             <a:pPr lvl="1"/>
             <a:r>
-              <a:rPr lang="bg-BG" dirty="0" smtClean="0"/>
+              <a:rPr lang="bg-BG" dirty="0"/>
               <a:t>Съхраняване</a:t>
             </a:r>
           </a:p>
           <a:p>
             <a:pPr lvl="1"/>
             <a:r>
-              <a:rPr lang="bg-BG" dirty="0" smtClean="0"/>
+              <a:rPr lang="bg-BG" dirty="0"/>
               <a:t>Обработване</a:t>
             </a:r>
           </a:p>
           <a:p>
             <a:pPr lvl="1"/>
             <a:r>
-              <a:rPr lang="bg-BG" dirty="0" smtClean="0"/>
+              <a:rPr lang="bg-BG" dirty="0"/>
               <a:t>Разпространяване</a:t>
             </a:r>
           </a:p>
           <a:p>
             <a:r>
-              <a:rPr lang="bg-BG" dirty="0" smtClean="0"/>
+              <a:rPr lang="bg-BG" dirty="0"/>
               <a:t>Основни </a:t>
             </a:r>
             <a:r>
-              <a:rPr lang="bg-BG" b="1" dirty="0" smtClean="0"/>
+              <a:rPr lang="bg-BG" b="1" dirty="0"/>
               <a:t>единици</a:t>
             </a:r>
             <a:r>
-              <a:rPr lang="bg-BG" dirty="0" smtClean="0"/>
+              <a:rPr lang="bg-BG" dirty="0"/>
               <a:t> за </a:t>
             </a:r>
             <a:r>
-              <a:rPr lang="bg-BG" b="1" dirty="0" smtClean="0"/>
+              <a:rPr lang="bg-BG" b="1" dirty="0"/>
               <a:t>измерване</a:t>
             </a:r>
             <a:r>
-              <a:rPr lang="bg-BG" dirty="0" smtClean="0"/>
+              <a:rPr lang="bg-BG" dirty="0"/>
               <a:t> на информация</a:t>
             </a:r>
           </a:p>
@@ -14611,7 +14499,7 @@
           <a:lstStyle/>
           <a:p>
             <a:r>
-              <a:rPr lang="bg-BG" dirty="0" smtClean="0"/>
+              <a:rPr lang="bg-BG" dirty="0"/>
               <a:t>Основни действия с информацията</a:t>
             </a:r>
             <a:endParaRPr lang="en-US" dirty="0"/>
@@ -14634,7 +14522,7 @@
           <a:lstStyle/>
           <a:p>
             <a:r>
-              <a:rPr lang="bg-BG" dirty="0" smtClean="0"/>
+              <a:rPr lang="bg-BG" dirty="0"/>
               <a:t>Информация</a:t>
             </a:r>
             <a:endParaRPr lang="en-US" dirty="0"/>
@@ -14707,13 +14595,6 @@
       <p:transition spd="slow" advClick="0" advTm="5000"/>
     </mc:Fallback>
   </mc:AlternateContent>
-  <p:timing>
-    <p:tnLst>
-      <p:par>
-        <p:cTn id="1" dur="indefinite" restart="never" nodeType="tmRoot"/>
-      </p:par>
-    </p:tnLst>
-  </p:timing>
 </p:sld>
 </file>
 
@@ -14750,25 +14631,26 @@
           <a:lstStyle/>
           <a:p>
             <a:r>
-              <a:rPr lang="bg-BG" dirty="0" smtClean="0"/>
+              <a:rPr lang="bg-BG" dirty="0"/>
               <a:t>Какво представляват </a:t>
             </a:r>
             <a:r>
-              <a:rPr lang="bg-BG" b="1" dirty="0" smtClean="0"/>
+              <a:rPr lang="bg-BG" b="1" dirty="0"/>
               <a:t>данните</a:t>
             </a:r>
             <a:r>
-              <a:rPr lang="bg-BG" dirty="0" smtClean="0"/>
+              <a:rPr lang="bg-BG" dirty="0"/>
               <a:t>?</a:t>
             </a:r>
           </a:p>
           <a:p>
-            <a:r>
-              <a:rPr lang="bg-BG" b="1" dirty="0" smtClean="0"/>
+            <a:pPr lvl="1"/>
+            <a:r>
+              <a:rPr lang="bg-BG" b="1" dirty="0"/>
               <a:t>͏</a:t>
             </a:r>
             <a:r>
-              <a:rPr lang="bg-BG" b="1" dirty="0" smtClean="0">
+              <a:rPr lang="bg-BG" b="1" dirty="0">
                 <a:solidFill>
                   <a:schemeClr val="bg1"/>
                 </a:solidFill>
@@ -14776,42 +14658,24 @@
               <a:t>Данни</a:t>
             </a:r>
             <a:r>
-              <a:rPr lang="bg-BG" dirty="0" smtClean="0"/>
-              <a:t> </a:t>
-            </a:r>
-            <a:r>
               <a:rPr lang="bg-BG" dirty="0"/>
-              <a:t>– символно записани факти</a:t>
-            </a:r>
-            <a:endParaRPr lang="bg-BG" dirty="0" smtClean="0"/>
-          </a:p>
-          <a:p>
-            <a:pPr lvl="1"/>
-            <a:r>
-              <a:rPr lang="ru-RU" dirty="0" smtClean="0"/>
-              <a:t>Те </a:t>
-            </a:r>
+              <a:t> – символно записани факти</a:t>
+            </a:r>
+          </a:p>
+          <a:p>
+            <a:pPr lvl="2"/>
             <a:r>
               <a:rPr lang="ru-RU" dirty="0"/>
-              <a:t>са неструктурирани сведения за даден обект или </a:t>
-            </a:r>
-            <a:r>
-              <a:rPr lang="ru-RU" dirty="0" smtClean="0"/>
-              <a:t>явление</a:t>
+              <a:t>Те са неструктурирани сведения за даден обект или явление</a:t>
             </a:r>
             <a:endParaRPr lang="bg-BG" dirty="0"/>
           </a:p>
           <a:p>
-            <a:pPr lvl="1"/>
+            <a:pPr lvl="2"/>
             <a:r>
               <a:rPr lang="bg-BG" dirty="0"/>
-              <a:t>Текст, звук, изображение, </a:t>
-            </a:r>
-            <a:r>
-              <a:rPr lang="bg-BG" dirty="0" smtClean="0"/>
-              <a:t>...</a:t>
-            </a:r>
-            <a:endParaRPr lang="bg-BG" dirty="0"/>
+              <a:t>Текст, звук, изображение, ...</a:t>
+            </a:r>
           </a:p>
           <a:p>
             <a:endParaRPr lang="en-US" dirty="0"/>
@@ -14834,7 +14698,7 @@
           <a:lstStyle/>
           <a:p>
             <a:r>
-              <a:rPr lang="bg-BG" dirty="0" smtClean="0"/>
+              <a:rPr lang="bg-BG" dirty="0"/>
               <a:t>Нека си припомним! (1)</a:t>
             </a:r>
             <a:endParaRPr lang="en-US" dirty="0"/>
@@ -14911,21 +14775,8 @@
               <a:buNone/>
               <a:tabLst/>
             </a:pPr>
-            <a:r>
-              <a:rPr kumimoji="0" lang="en-US" altLang="en-US" sz="1800" b="0" i="0" u="none" strike="noStrike" cap="none" normalizeH="0" baseline="0" smtClean="0">
-                <a:ln>
-                  <a:noFill/>
-                </a:ln>
-                <a:solidFill>
-                  <a:srgbClr val="FFFFFF"/>
-                </a:solidFill>
-                <a:effectLst/>
-                <a:latin typeface="Söhne"/>
-              </a:rPr>
-              <a:t/>
-            </a:r>
             <a:br>
-              <a:rPr kumimoji="0" lang="en-US" altLang="en-US" sz="1800" b="0" i="0" u="none" strike="noStrike" cap="none" normalizeH="0" baseline="0" smtClean="0">
+              <a:rPr kumimoji="0" lang="en-US" altLang="en-US" sz="1800" b="0" i="0" u="none" strike="noStrike" cap="none" normalizeH="0" baseline="0">
                 <a:ln>
                   <a:noFill/>
                 </a:ln>
@@ -14936,7 +14787,7 @@
                 <a:latin typeface="Söhne"/>
               </a:rPr>
             </a:br>
-            <a:endParaRPr kumimoji="0" lang="en-US" altLang="en-US" sz="1800" b="0" i="0" u="none" strike="noStrike" cap="none" normalizeH="0" baseline="0" smtClean="0">
+            <a:endParaRPr kumimoji="0" lang="en-US" altLang="en-US" sz="1800" b="0" i="0" u="none" strike="noStrike" cap="none" normalizeH="0" baseline="0">
               <a:ln>
                 <a:noFill/>
               </a:ln>
@@ -15383,12 +15234,13 @@
             </a:r>
           </a:p>
           <a:p>
-            <a:r>
-              <a:rPr lang="bg-BG" b="1" dirty="0" smtClean="0"/>
-              <a:t>͏</a:t>
-            </a:r>
-            <a:r>
-              <a:rPr lang="bg-BG" b="1" dirty="0" smtClean="0">
+            <a:pPr lvl="1">
+              <a:buClr>
+                <a:schemeClr val="tx1"/>
+              </a:buClr>
+            </a:pPr>
+            <a:r>
+              <a:rPr lang="bg-BG" b="1" dirty="0">
                 <a:solidFill>
                   <a:schemeClr val="bg1"/>
                 </a:solidFill>
@@ -15396,7 +15248,7 @@
               <a:t>Информация</a:t>
             </a:r>
             <a:r>
-              <a:rPr lang="bg-BG" dirty="0" smtClean="0"/>
+              <a:rPr lang="bg-BG" dirty="0"/>
               <a:t> </a:t>
             </a:r>
             <a:r>
@@ -15405,7 +15257,7 @@
             </a:r>
             <a:r>
               <a:rPr lang="bg-BG" dirty="0"/>
-              <a:t>съвкупност от структуриани </a:t>
+              <a:t>съвкупност от структурирани </a:t>
             </a:r>
             <a:r>
               <a:rPr lang="bg-BG" b="1" dirty="0"/>
@@ -15421,11 +15273,7 @@
             </a:r>
             <a:r>
               <a:rPr lang="bg-BG" dirty="0"/>
-              <a:t> представата ни за </a:t>
-            </a:r>
-            <a:r>
-              <a:rPr lang="bg-BG" dirty="0" smtClean="0"/>
-              <a:t>тях</a:t>
+              <a:t> представата ни за тях</a:t>
             </a:r>
             <a:endParaRPr lang="bg-BG" b="1" dirty="0"/>
           </a:p>
@@ -15448,11 +15296,7 @@
           <a:p>
             <a:r>
               <a:rPr lang="bg-BG" dirty="0"/>
-              <a:t>Нека си припомним! </a:t>
-            </a:r>
-            <a:r>
-              <a:rPr lang="bg-BG" dirty="0" smtClean="0"/>
-              <a:t>(2)</a:t>
+              <a:t>Нека си припомним! (2)</a:t>
             </a:r>
             <a:endParaRPr lang="en-US" dirty="0"/>
           </a:p>
@@ -15481,8 +15325,8 @@
         </p:blipFill>
         <p:spPr bwMode="auto">
           <a:xfrm>
-            <a:off x="986243" y="3699001"/>
-            <a:ext cx="4929757" cy="2807224"/>
+            <a:off x="673267" y="3336088"/>
+            <a:ext cx="5422733" cy="3087946"/>
           </a:xfrm>
           <a:prstGeom prst="rect">
             <a:avLst/>
@@ -15529,8 +15373,8 @@
         </p:blipFill>
         <p:spPr bwMode="auto">
           <a:xfrm>
-            <a:off x="6653115" y="3699001"/>
-            <a:ext cx="4219056" cy="2804576"/>
+            <a:off x="6765038" y="3339000"/>
+            <a:ext cx="4640962" cy="3085034"/>
           </a:xfrm>
           <a:prstGeom prst="rect">
             <a:avLst/>
@@ -15776,51 +15620,51 @@
           <a:lstStyle/>
           <a:p>
             <a:r>
-              <a:rPr lang="bg-BG" dirty="0" smtClean="0"/>
+              <a:rPr lang="bg-BG" dirty="0"/>
               <a:t>Събирането на </a:t>
             </a:r>
             <a:r>
-              <a:rPr lang="bg-BG" b="1" dirty="0" smtClean="0"/>
+              <a:rPr lang="bg-BG" b="1" dirty="0"/>
               <a:t>информация</a:t>
             </a:r>
             <a:r>
-              <a:rPr lang="bg-BG" dirty="0" smtClean="0"/>
+              <a:rPr lang="bg-BG" dirty="0"/>
               <a:t> в компютрите се извършва с помощта на </a:t>
             </a:r>
             <a:r>
-              <a:rPr lang="bg-BG" b="1" dirty="0" smtClean="0"/>
+              <a:rPr lang="bg-BG" b="1" dirty="0"/>
               <a:t>входни устройства </a:t>
             </a:r>
             <a:r>
-              <a:rPr lang="bg-BG" dirty="0" smtClean="0"/>
+              <a:rPr lang="bg-BG" dirty="0"/>
               <a:t>като например:</a:t>
             </a:r>
           </a:p>
           <a:p>
             <a:pPr lvl="1"/>
             <a:r>
-              <a:rPr lang="bg-BG" dirty="0" smtClean="0"/>
+              <a:rPr lang="bg-BG" dirty="0"/>
               <a:t>Клавиатура</a:t>
             </a:r>
           </a:p>
           <a:p>
             <a:pPr lvl="1"/>
             <a:r>
-              <a:rPr lang="bg-BG" dirty="0" smtClean="0"/>
+              <a:rPr lang="bg-BG" dirty="0"/>
               <a:t>Мишка</a:t>
             </a:r>
           </a:p>
           <a:p>
             <a:pPr lvl="1"/>
             <a:r>
-              <a:rPr lang="bg-BG" dirty="0" smtClean="0"/>
+              <a:rPr lang="bg-BG" dirty="0"/>
               <a:t>Микрофон</a:t>
             </a:r>
           </a:p>
           <a:p>
             <a:pPr lvl="1"/>
             <a:r>
-              <a:rPr lang="bg-BG" dirty="0" smtClean="0"/>
+              <a:rPr lang="bg-BG" dirty="0"/>
               <a:t>Скенер</a:t>
             </a:r>
             <a:endParaRPr lang="en-US" dirty="0"/>
@@ -15843,7 +15687,7 @@
           <a:lstStyle/>
           <a:p>
             <a:r>
-              <a:rPr lang="bg-BG" dirty="0" smtClean="0"/>
+              <a:rPr lang="bg-BG" dirty="0"/>
               <a:t>Събиране на информация</a:t>
             </a:r>
             <a:endParaRPr lang="en-US" dirty="0"/>
@@ -16380,98 +16224,94 @@
           <a:lstStyle/>
           <a:p>
             <a:r>
-              <a:rPr lang="bg-BG" dirty="0" smtClean="0"/>
+              <a:rPr lang="bg-BG" dirty="0"/>
               <a:t>С цел </a:t>
             </a:r>
             <a:r>
-              <a:rPr lang="bg-BG" b="1" dirty="0" smtClean="0"/>
+              <a:rPr lang="bg-BG" b="1" dirty="0"/>
               <a:t>запазване</a:t>
             </a:r>
             <a:r>
-              <a:rPr lang="bg-BG" dirty="0" smtClean="0"/>
+              <a:rPr lang="bg-BG" dirty="0"/>
               <a:t> и </a:t>
             </a:r>
             <a:r>
-              <a:rPr lang="bg-BG" b="1" dirty="0" smtClean="0"/>
+              <a:rPr lang="bg-BG" b="1" dirty="0"/>
               <a:t>преизползване</a:t>
             </a:r>
             <a:r>
-              <a:rPr lang="bg-BG" dirty="0" smtClean="0"/>
+              <a:rPr lang="bg-BG" dirty="0"/>
               <a:t> на информация, тя се </a:t>
             </a:r>
             <a:r>
-              <a:rPr lang="bg-BG" b="1" dirty="0" smtClean="0"/>
+              <a:rPr lang="bg-BG" b="1" dirty="0"/>
               <a:t>съхранява</a:t>
             </a:r>
             <a:r>
-              <a:rPr lang="bg-BG" dirty="0" smtClean="0"/>
+              <a:rPr lang="bg-BG" dirty="0"/>
               <a:t> на различни</a:t>
             </a:r>
             <a:r>
-              <a:rPr lang="en-US" dirty="0" smtClean="0"/>
+              <a:rPr lang="en-US" dirty="0"/>
               <a:t> </a:t>
             </a:r>
             <a:r>
               <a:rPr lang="bg-BG" dirty="0"/>
-              <a:t>носители на информация</a:t>
-            </a:r>
-            <a:r>
-              <a:rPr lang="bg-BG" dirty="0" smtClean="0"/>
-              <a:t> (</a:t>
+              <a:t>носители на информация (</a:t>
             </a:r>
             <a:r>
               <a:rPr lang="bg-BG" b="1" dirty="0"/>
               <a:t>НИ</a:t>
             </a:r>
             <a:r>
-              <a:rPr lang="bg-BG" dirty="0" smtClean="0"/>
+              <a:rPr lang="bg-BG" dirty="0"/>
               <a:t>)</a:t>
             </a:r>
           </a:p>
           <a:p>
             <a:pPr lvl="1"/>
             <a:r>
-              <a:rPr lang="bg-BG" dirty="0" smtClean="0"/>
+              <a:rPr lang="bg-BG" dirty="0"/>
               <a:t>Твърд диск</a:t>
             </a:r>
             <a:r>
-              <a:rPr lang="en-US" dirty="0" smtClean="0"/>
+              <a:rPr lang="en-US" dirty="0"/>
               <a:t> (</a:t>
             </a:r>
             <a:r>
-              <a:rPr lang="en-US" b="1" dirty="0" smtClean="0"/>
+              <a:rPr lang="en-US" b="1" dirty="0"/>
               <a:t>HDD</a:t>
             </a:r>
             <a:r>
-              <a:rPr lang="en-US" dirty="0" smtClean="0"/>
+              <a:rPr lang="en-US" dirty="0"/>
               <a:t>)</a:t>
             </a:r>
-            <a:endParaRPr lang="bg-BG" dirty="0" smtClean="0"/>
+            <a:endParaRPr lang="bg-BG" dirty="0"/>
           </a:p>
           <a:p>
             <a:pPr lvl="1"/>
             <a:r>
-              <a:rPr lang="bg-BG" dirty="0" smtClean="0"/>
+              <a:rPr lang="bg-BG" dirty="0"/>
               <a:t>Дигитален видеодиск </a:t>
             </a:r>
             <a:r>
-              <a:rPr lang="en-US" dirty="0" smtClean="0"/>
+              <a:rPr lang="en-US" dirty="0"/>
               <a:t>(</a:t>
             </a:r>
             <a:r>
-              <a:rPr lang="en-US" b="1" dirty="0" smtClean="0"/>
+              <a:rPr lang="en-US" b="1" dirty="0"/>
               <a:t>DVD</a:t>
             </a:r>
             <a:r>
-              <a:rPr lang="en-US" dirty="0" smtClean="0"/>
+              <a:rPr lang="en-US" dirty="0"/>
               <a:t>)</a:t>
             </a:r>
-            <a:endParaRPr lang="bg-BG" dirty="0" smtClean="0"/>
+            <a:endParaRPr lang="bg-BG" dirty="0"/>
           </a:p>
           <a:p>
             <a:pPr lvl="1"/>
             <a:r>
-              <a:rPr lang="bg-BG" dirty="0" smtClean="0"/>
+              <a:rPr lang="bg-BG" dirty="0"/>
               <a:t>Флашпамет</a:t>
             </a:r>
             <a:endParaRPr lang="en-US" dirty="0"/>
@@ -16494,7 +16334,7 @@
           <a:lstStyle/>
           <a:p>
             <a:r>
-              <a:rPr lang="bg-BG" dirty="0" smtClean="0"/>
+              <a:rPr lang="bg-BG" dirty="0"/>
               <a:t>Съхраняване на информация</a:t>
             </a:r>
             <a:endParaRPr lang="en-US" dirty="0"/>
@@ -16940,65 +16780,65 @@
           <a:lstStyle/>
           <a:p>
             <a:r>
-              <a:rPr lang="bg-BG" b="1" dirty="0" smtClean="0"/>
+              <a:rPr lang="bg-BG" b="1" dirty="0"/>
               <a:t>Обработването</a:t>
             </a:r>
             <a:r>
-              <a:rPr lang="bg-BG" dirty="0" smtClean="0"/>
+              <a:rPr lang="bg-BG" dirty="0"/>
               <a:t> на информация включва </a:t>
             </a:r>
             <a:r>
-              <a:rPr lang="bg-BG" b="1" dirty="0" smtClean="0"/>
+              <a:rPr lang="bg-BG" b="1" dirty="0"/>
               <a:t>анализиране</a:t>
             </a:r>
             <a:r>
-              <a:rPr lang="bg-BG" dirty="0" smtClean="0"/>
+              <a:rPr lang="bg-BG" dirty="0"/>
               <a:t>, </a:t>
             </a:r>
             <a:r>
-              <a:rPr lang="bg-BG" b="1" dirty="0" smtClean="0"/>
+              <a:rPr lang="bg-BG" b="1" dirty="0"/>
               <a:t>редактиране</a:t>
             </a:r>
             <a:r>
-              <a:rPr lang="bg-BG" dirty="0" smtClean="0"/>
+              <a:rPr lang="bg-BG" dirty="0"/>
               <a:t> и извършване на различни операции</a:t>
             </a:r>
           </a:p>
           <a:p>
             <a:pPr lvl="1"/>
             <a:r>
-              <a:rPr lang="bg-BG" dirty="0" smtClean="0"/>
+              <a:rPr lang="bg-BG" dirty="0"/>
               <a:t>Осъществява се от различни </a:t>
             </a:r>
             <a:r>
-              <a:rPr lang="bg-BG" b="1" dirty="0" smtClean="0"/>
+              <a:rPr lang="bg-BG" b="1" dirty="0"/>
               <a:t>компютърни програми</a:t>
             </a:r>
           </a:p>
           <a:p>
             <a:r>
-              <a:rPr lang="bg-BG" dirty="0" smtClean="0"/>
+              <a:rPr lang="bg-BG" dirty="0"/>
               <a:t>Вие вече познавате и използвате различни програми за обработка на:</a:t>
             </a:r>
           </a:p>
           <a:p>
             <a:pPr lvl="1"/>
             <a:r>
-              <a:rPr lang="bg-BG" dirty="0" smtClean="0"/>
+              <a:rPr lang="bg-BG" dirty="0"/>
               <a:t>Текст</a:t>
             </a:r>
           </a:p>
           <a:p>
             <a:pPr lvl="1"/>
             <a:r>
-              <a:rPr lang="bg-BG" dirty="0" smtClean="0"/>
+              <a:rPr lang="bg-BG" dirty="0"/>
               <a:t>Изображение</a:t>
             </a:r>
           </a:p>
           <a:p>
             <a:pPr lvl="1"/>
             <a:r>
-              <a:rPr lang="bg-BG" dirty="0" smtClean="0"/>
+              <a:rPr lang="bg-BG" dirty="0"/>
               <a:t>Таблица</a:t>
             </a:r>
             <a:endParaRPr lang="en-US" dirty="0"/>
@@ -17021,7 +16861,7 @@
           <a:lstStyle/>
           <a:p>
             <a:r>
-              <a:rPr lang="bg-BG" dirty="0" smtClean="0"/>
+              <a:rPr lang="bg-BG" dirty="0"/>
               <a:t>Обработване на информация</a:t>
             </a:r>
             <a:endParaRPr lang="en-US" dirty="0"/>
@@ -17563,51 +17403,51 @@
           <a:lstStyle/>
           <a:p>
             <a:r>
-              <a:rPr lang="bg-BG" dirty="0" smtClean="0"/>
+              <a:rPr lang="bg-BG" dirty="0"/>
               <a:t>Информацията може да бъде </a:t>
             </a:r>
             <a:r>
-              <a:rPr lang="bg-BG" b="1" dirty="0" smtClean="0"/>
+              <a:rPr lang="bg-BG" b="1" dirty="0"/>
               <a:t>разпространявана</a:t>
             </a:r>
             <a:r>
-              <a:rPr lang="bg-BG" dirty="0" smtClean="0"/>
+              <a:rPr lang="bg-BG" dirty="0"/>
               <a:t> чрез </a:t>
             </a:r>
             <a:r>
-              <a:rPr lang="bg-BG" b="1" dirty="0" smtClean="0"/>
+              <a:rPr lang="bg-BG" b="1" dirty="0"/>
               <a:t>изходни устройства</a:t>
             </a:r>
             <a:r>
-              <a:rPr lang="bg-BG" dirty="0" smtClean="0"/>
+              <a:rPr lang="bg-BG" dirty="0"/>
               <a:t>:</a:t>
             </a:r>
           </a:p>
           <a:p>
             <a:pPr lvl="1"/>
             <a:r>
-              <a:rPr lang="bg-BG" dirty="0" smtClean="0"/>
+              <a:rPr lang="bg-BG" dirty="0"/>
               <a:t>Принтер</a:t>
             </a:r>
           </a:p>
           <a:p>
             <a:pPr lvl="1"/>
             <a:r>
-              <a:rPr lang="bg-BG" dirty="0" smtClean="0"/>
+              <a:rPr lang="bg-BG" dirty="0"/>
               <a:t>Тонколони</a:t>
             </a:r>
           </a:p>
           <a:p>
             <a:pPr lvl="1"/>
             <a:r>
-              <a:rPr lang="bg-BG" dirty="0" smtClean="0"/>
+              <a:rPr lang="bg-BG" dirty="0"/>
               <a:t>Слушалки</a:t>
             </a:r>
           </a:p>
           <a:p>
             <a:pPr lvl="1"/>
             <a:r>
-              <a:rPr lang="bg-BG" dirty="0" smtClean="0"/>
+              <a:rPr lang="bg-BG" dirty="0"/>
               <a:t>Монитор </a:t>
             </a:r>
             <a:endParaRPr lang="en-US" dirty="0"/>
@@ -17630,7 +17470,7 @@
           <a:lstStyle/>
           <a:p>
             <a:r>
-              <a:rPr lang="bg-BG" dirty="0" smtClean="0"/>
+              <a:rPr lang="bg-BG" dirty="0"/>
               <a:t>Разпостраняване на информация</a:t>
             </a:r>
             <a:endParaRPr lang="en-US" dirty="0"/>

</xml_diff>